<commit_message>
implement redirection to each page
 - remove test code
 - make all property managed in application.properties
</commit_message>
<xml_diff>
--- a/스케줄 부탁해.pptx
+++ b/스케줄 부탁해.pptx
@@ -256,7 +256,7 @@
           <a:p>
             <a:fld id="{BA2F37C9-C27B-4695-AA0E-7193631331FC}" type="datetimeFigureOut">
               <a:rPr lang="ko-KR" altLang="en-US" smtClean="0"/>
-              <a:t>2021-07-25</a:t>
+              <a:t>2021-08-08</a:t>
             </a:fld>
             <a:endParaRPr lang="ko-KR" altLang="en-US"/>
           </a:p>
@@ -433,7 +433,7 @@
           <a:p>
             <a:fld id="{BA2F37C9-C27B-4695-AA0E-7193631331FC}" type="datetimeFigureOut">
               <a:rPr lang="ko-KR" altLang="en-US" smtClean="0"/>
-              <a:t>2021-07-25</a:t>
+              <a:t>2021-08-08</a:t>
             </a:fld>
             <a:endParaRPr lang="ko-KR" altLang="en-US"/>
           </a:p>
@@ -620,7 +620,7 @@
           <a:p>
             <a:fld id="{BA2F37C9-C27B-4695-AA0E-7193631331FC}" type="datetimeFigureOut">
               <a:rPr lang="ko-KR" altLang="en-US" smtClean="0"/>
-              <a:t>2021-07-25</a:t>
+              <a:t>2021-08-08</a:t>
             </a:fld>
             <a:endParaRPr lang="ko-KR" altLang="en-US"/>
           </a:p>
@@ -794,7 +794,7 @@
           <a:p>
             <a:fld id="{BA2F37C9-C27B-4695-AA0E-7193631331FC}" type="datetimeFigureOut">
               <a:rPr lang="ko-KR" altLang="en-US" smtClean="0"/>
-              <a:t>2021-07-25</a:t>
+              <a:t>2021-08-08</a:t>
             </a:fld>
             <a:endParaRPr lang="ko-KR" altLang="en-US"/>
           </a:p>
@@ -1047,7 +1047,7 @@
           <a:p>
             <a:fld id="{BA2F37C9-C27B-4695-AA0E-7193631331FC}" type="datetimeFigureOut">
               <a:rPr lang="ko-KR" altLang="en-US" smtClean="0"/>
-              <a:t>2021-07-25</a:t>
+              <a:t>2021-08-08</a:t>
             </a:fld>
             <a:endParaRPr lang="ko-KR" altLang="en-US"/>
           </a:p>
@@ -1286,7 +1286,7 @@
           <a:p>
             <a:fld id="{BA2F37C9-C27B-4695-AA0E-7193631331FC}" type="datetimeFigureOut">
               <a:rPr lang="ko-KR" altLang="en-US" smtClean="0"/>
-              <a:t>2021-07-25</a:t>
+              <a:t>2021-08-08</a:t>
             </a:fld>
             <a:endParaRPr lang="ko-KR" altLang="en-US"/>
           </a:p>
@@ -1653,7 +1653,7 @@
           <a:p>
             <a:fld id="{BA2F37C9-C27B-4695-AA0E-7193631331FC}" type="datetimeFigureOut">
               <a:rPr lang="ko-KR" altLang="en-US" smtClean="0"/>
-              <a:t>2021-07-25</a:t>
+              <a:t>2021-08-08</a:t>
             </a:fld>
             <a:endParaRPr lang="ko-KR" altLang="en-US"/>
           </a:p>
@@ -1771,7 +1771,7 @@
           <a:p>
             <a:fld id="{BA2F37C9-C27B-4695-AA0E-7193631331FC}" type="datetimeFigureOut">
               <a:rPr lang="ko-KR" altLang="en-US" smtClean="0"/>
-              <a:t>2021-07-25</a:t>
+              <a:t>2021-08-08</a:t>
             </a:fld>
             <a:endParaRPr lang="ko-KR" altLang="en-US"/>
           </a:p>
@@ -1866,7 +1866,7 @@
           <a:p>
             <a:fld id="{BA2F37C9-C27B-4695-AA0E-7193631331FC}" type="datetimeFigureOut">
               <a:rPr lang="ko-KR" altLang="en-US" smtClean="0"/>
-              <a:t>2021-07-25</a:t>
+              <a:t>2021-08-08</a:t>
             </a:fld>
             <a:endParaRPr lang="ko-KR" altLang="en-US"/>
           </a:p>
@@ -2143,7 +2143,7 @@
           <a:p>
             <a:fld id="{BA2F37C9-C27B-4695-AA0E-7193631331FC}" type="datetimeFigureOut">
               <a:rPr lang="ko-KR" altLang="en-US" smtClean="0"/>
-              <a:t>2021-07-25</a:t>
+              <a:t>2021-08-08</a:t>
             </a:fld>
             <a:endParaRPr lang="ko-KR" altLang="en-US"/>
           </a:p>
@@ -2396,7 +2396,7 @@
           <a:p>
             <a:fld id="{BA2F37C9-C27B-4695-AA0E-7193631331FC}" type="datetimeFigureOut">
               <a:rPr lang="ko-KR" altLang="en-US" smtClean="0"/>
-              <a:t>2021-07-25</a:t>
+              <a:t>2021-08-08</a:t>
             </a:fld>
             <a:endParaRPr lang="ko-KR" altLang="en-US"/>
           </a:p>
@@ -2609,7 +2609,7 @@
           <a:p>
             <a:fld id="{BA2F37C9-C27B-4695-AA0E-7193631331FC}" type="datetimeFigureOut">
               <a:rPr lang="ko-KR" altLang="en-US" smtClean="0"/>
-              <a:t>2021-07-25</a:t>
+              <a:t>2021-08-08</a:t>
             </a:fld>
             <a:endParaRPr lang="ko-KR" altLang="en-US"/>
           </a:p>
@@ -10594,11 +10594,11 @@
           <a:p>
             <a:pPr lvl="1"/>
             <a:r>
-              <a:rPr lang="ko-KR" altLang="en-US" dirty="0" smtClean="0"/>
+              <a:rPr lang="ko-KR" altLang="en-US" strike="sngStrike" dirty="0" smtClean="0"/>
               <a:t>카카오 로그인</a:t>
             </a:r>
             <a:r>
-              <a:rPr lang="en-US" altLang="ko-KR" dirty="0" smtClean="0"/>
+              <a:rPr lang="en-US" altLang="ko-KR" strike="sngStrike" dirty="0" smtClean="0"/>
               <a:t> redirect</a:t>
             </a:r>
           </a:p>
@@ -10680,11 +10680,19 @@
             <a:pPr lvl="1"/>
             <a:r>
               <a:rPr lang="en-US" altLang="ko-KR" dirty="0" smtClean="0"/>
-              <a:t>Server </a:t>
-            </a:r>
-            <a:r>
-              <a:rPr lang="en-US" altLang="ko-KR" dirty="0" smtClean="0"/>
-              <a:t>API</a:t>
+              <a:t>Server API </a:t>
+            </a:r>
+            <a:r>
+              <a:rPr lang="ko-KR" altLang="en-US" smtClean="0"/>
+              <a:t>생성</a:t>
+            </a:r>
+            <a:endParaRPr lang="en-US" altLang="ko-KR" dirty="0" smtClean="0"/>
+          </a:p>
+          <a:p>
+            <a:pPr lvl="1"/>
+            <a:r>
+              <a:rPr lang="en-US" altLang="ko-KR" dirty="0" err="1" smtClean="0"/>
+              <a:t>DeadlineNotify</a:t>
             </a:r>
             <a:r>
               <a:rPr lang="en-US" altLang="ko-KR" dirty="0" smtClean="0"/>
@@ -10692,22 +10700,6 @@
             </a:r>
             <a:r>
               <a:rPr lang="ko-KR" altLang="en-US" smtClean="0"/>
-              <a:t>생성</a:t>
-            </a:r>
-            <a:endParaRPr lang="en-US" altLang="ko-KR" dirty="0" smtClean="0"/>
-          </a:p>
-          <a:p>
-            <a:pPr lvl="1"/>
-            <a:r>
-              <a:rPr lang="en-US" altLang="ko-KR" dirty="0" err="1" smtClean="0"/>
-              <a:t>DeadlineNotify</a:t>
-            </a:r>
-            <a:r>
-              <a:rPr lang="en-US" altLang="ko-KR" dirty="0" smtClean="0"/>
-              <a:t> </a:t>
-            </a:r>
-            <a:r>
-              <a:rPr lang="ko-KR" altLang="en-US" smtClean="0"/>
               <a:t>구현</a:t>
             </a:r>
             <a:endParaRPr lang="en-US" altLang="ko-KR" dirty="0"/>
@@ -10735,14 +10727,14 @@
           <a:p>
             <a:pPr lvl="1"/>
             <a:r>
-              <a:rPr lang="en-US" altLang="ko-KR" dirty="0" smtClean="0"/>
+              <a:rPr lang="en-US" altLang="ko-KR" strike="sngStrike" dirty="0" smtClean="0"/>
               <a:t>Logger </a:t>
             </a:r>
             <a:r>
-              <a:rPr lang="ko-KR" altLang="en-US" smtClean="0"/>
+              <a:rPr lang="ko-KR" altLang="en-US" strike="sngStrike" smtClean="0"/>
               <a:t>설정</a:t>
             </a:r>
-            <a:endParaRPr lang="en-US" altLang="ko-KR" dirty="0" smtClean="0"/>
+            <a:endParaRPr lang="en-US" altLang="ko-KR" strike="sngStrike" dirty="0" smtClean="0"/>
           </a:p>
           <a:p>
             <a:pPr lvl="1"/>

</xml_diff>